<commit_message>
Updates aan PP en Tekst
</commit_message>
<xml_diff>
--- a/PowerPoint.pptx
+++ b/PowerPoint.pptx
@@ -8,6 +8,8 @@
     <p:sldId id="256" r:id="rId2"/>
     <p:sldId id="257" r:id="rId3"/>
     <p:sldId id="258" r:id="rId4"/>
+    <p:sldId id="259" r:id="rId5"/>
+    <p:sldId id="260" r:id="rId6"/>
   </p:sldIdLst>
   <p:sldSz cx="12192000" cy="6858000"/>
   <p:notesSz cx="6858000" cy="9144000"/>
@@ -305,7 +307,7 @@
           <a:p>
             <a:fld id="{4EC87238-8AE5-4254-B341-F7F1A060BE88}" type="datetimeFigureOut">
               <a:rPr lang="nl-NL" smtClean="0"/>
-              <a:t>13-12-2019</a:t>
+              <a:t>15-12-2019</a:t>
             </a:fld>
             <a:endParaRPr lang="nl-NL"/>
           </a:p>
@@ -741,7 +743,7 @@
           <a:p>
             <a:fld id="{4EC87238-8AE5-4254-B341-F7F1A060BE88}" type="datetimeFigureOut">
               <a:rPr lang="nl-NL" smtClean="0"/>
-              <a:t>13-12-2019</a:t>
+              <a:t>15-12-2019</a:t>
             </a:fld>
             <a:endParaRPr lang="nl-NL"/>
           </a:p>
@@ -991,7 +993,7 @@
           <a:p>
             <a:fld id="{4EC87238-8AE5-4254-B341-F7F1A060BE88}" type="datetimeFigureOut">
               <a:rPr lang="nl-NL" smtClean="0"/>
-              <a:t>13-12-2019</a:t>
+              <a:t>15-12-2019</a:t>
             </a:fld>
             <a:endParaRPr lang="nl-NL"/>
           </a:p>
@@ -1299,7 +1301,7 @@
           <a:p>
             <a:fld id="{4EC87238-8AE5-4254-B341-F7F1A060BE88}" type="datetimeFigureOut">
               <a:rPr lang="nl-NL" smtClean="0"/>
-              <a:t>13-12-2019</a:t>
+              <a:t>15-12-2019</a:t>
             </a:fld>
             <a:endParaRPr lang="nl-NL"/>
           </a:p>
@@ -1617,7 +1619,7 @@
           <a:p>
             <a:fld id="{4EC87238-8AE5-4254-B341-F7F1A060BE88}" type="datetimeFigureOut">
               <a:rPr lang="nl-NL" smtClean="0"/>
-              <a:t>13-12-2019</a:t>
+              <a:t>15-12-2019</a:t>
             </a:fld>
             <a:endParaRPr lang="nl-NL"/>
           </a:p>
@@ -1919,7 +1921,7 @@
           <a:p>
             <a:fld id="{4EC87238-8AE5-4254-B341-F7F1A060BE88}" type="datetimeFigureOut">
               <a:rPr lang="nl-NL" smtClean="0"/>
-              <a:t>13-12-2019</a:t>
+              <a:t>15-12-2019</a:t>
             </a:fld>
             <a:endParaRPr lang="nl-NL"/>
           </a:p>
@@ -2286,7 +2288,7 @@
           <a:p>
             <a:fld id="{4EC87238-8AE5-4254-B341-F7F1A060BE88}" type="datetimeFigureOut">
               <a:rPr lang="nl-NL" smtClean="0"/>
-              <a:t>13-12-2019</a:t>
+              <a:t>15-12-2019</a:t>
             </a:fld>
             <a:endParaRPr lang="nl-NL"/>
           </a:p>
@@ -2460,7 +2462,7 @@
           <a:p>
             <a:fld id="{4EC87238-8AE5-4254-B341-F7F1A060BE88}" type="datetimeFigureOut">
               <a:rPr lang="nl-NL" smtClean="0"/>
-              <a:t>13-12-2019</a:t>
+              <a:t>15-12-2019</a:t>
             </a:fld>
             <a:endParaRPr lang="nl-NL"/>
           </a:p>
@@ -2640,7 +2642,7 @@
           <a:p>
             <a:fld id="{4EC87238-8AE5-4254-B341-F7F1A060BE88}" type="datetimeFigureOut">
               <a:rPr lang="nl-NL" smtClean="0"/>
-              <a:t>13-12-2019</a:t>
+              <a:t>15-12-2019</a:t>
             </a:fld>
             <a:endParaRPr lang="nl-NL"/>
           </a:p>
@@ -2810,7 +2812,7 @@
           <a:p>
             <a:fld id="{4EC87238-8AE5-4254-B341-F7F1A060BE88}" type="datetimeFigureOut">
               <a:rPr lang="nl-NL" smtClean="0"/>
-              <a:t>13-12-2019</a:t>
+              <a:t>15-12-2019</a:t>
             </a:fld>
             <a:endParaRPr lang="nl-NL"/>
           </a:p>
@@ -3060,7 +3062,7 @@
           <a:p>
             <a:fld id="{4EC87238-8AE5-4254-B341-F7F1A060BE88}" type="datetimeFigureOut">
               <a:rPr lang="nl-NL" smtClean="0"/>
-              <a:t>13-12-2019</a:t>
+              <a:t>15-12-2019</a:t>
             </a:fld>
             <a:endParaRPr lang="nl-NL"/>
           </a:p>
@@ -3296,7 +3298,7 @@
           <a:p>
             <a:fld id="{4EC87238-8AE5-4254-B341-F7F1A060BE88}" type="datetimeFigureOut">
               <a:rPr lang="nl-NL" smtClean="0"/>
-              <a:t>13-12-2019</a:t>
+              <a:t>15-12-2019</a:t>
             </a:fld>
             <a:endParaRPr lang="nl-NL"/>
           </a:p>
@@ -3678,7 +3680,7 @@
           <a:p>
             <a:fld id="{4EC87238-8AE5-4254-B341-F7F1A060BE88}" type="datetimeFigureOut">
               <a:rPr lang="nl-NL" smtClean="0"/>
-              <a:t>13-12-2019</a:t>
+              <a:t>15-12-2019</a:t>
             </a:fld>
             <a:endParaRPr lang="nl-NL"/>
           </a:p>
@@ -3796,7 +3798,7 @@
           <a:p>
             <a:fld id="{4EC87238-8AE5-4254-B341-F7F1A060BE88}" type="datetimeFigureOut">
               <a:rPr lang="nl-NL" smtClean="0"/>
-              <a:t>13-12-2019</a:t>
+              <a:t>15-12-2019</a:t>
             </a:fld>
             <a:endParaRPr lang="nl-NL"/>
           </a:p>
@@ -3891,7 +3893,7 @@
           <a:p>
             <a:fld id="{4EC87238-8AE5-4254-B341-F7F1A060BE88}" type="datetimeFigureOut">
               <a:rPr lang="nl-NL" smtClean="0"/>
-              <a:t>13-12-2019</a:t>
+              <a:t>15-12-2019</a:t>
             </a:fld>
             <a:endParaRPr lang="nl-NL"/>
           </a:p>
@@ -4146,7 +4148,7 @@
           <a:p>
             <a:fld id="{4EC87238-8AE5-4254-B341-F7F1A060BE88}" type="datetimeFigureOut">
               <a:rPr lang="nl-NL" smtClean="0"/>
-              <a:t>13-12-2019</a:t>
+              <a:t>15-12-2019</a:t>
             </a:fld>
             <a:endParaRPr lang="nl-NL"/>
           </a:p>
@@ -4429,7 +4431,7 @@
           <a:p>
             <a:fld id="{4EC87238-8AE5-4254-B341-F7F1A060BE88}" type="datetimeFigureOut">
               <a:rPr lang="nl-NL" smtClean="0"/>
-              <a:t>13-12-2019</a:t>
+              <a:t>15-12-2019</a:t>
             </a:fld>
             <a:endParaRPr lang="nl-NL"/>
           </a:p>
@@ -4835,7 +4837,7 @@
           <a:p>
             <a:fld id="{4EC87238-8AE5-4254-B341-F7F1A060BE88}" type="datetimeFigureOut">
               <a:rPr lang="nl-NL" smtClean="0"/>
-              <a:t>13-12-2019</a:t>
+              <a:t>15-12-2019</a:t>
             </a:fld>
             <a:endParaRPr lang="nl-NL"/>
           </a:p>
@@ -7306,6 +7308,612 @@
 </p:sld>
 </file>
 
+<file path=ppt/slides/slide4.xml><?xml version="1.0" encoding="utf-8"?>
+<p:sld xmlns:a="http://schemas.openxmlformats.org/drawingml/2006/main" xmlns:r="http://schemas.openxmlformats.org/officeDocument/2006/relationships" xmlns:p="http://schemas.openxmlformats.org/presentationml/2006/main">
+  <p:cSld>
+    <p:bg>
+      <p:bgPr>
+        <a:gradFill rotWithShape="1">
+          <a:gsLst>
+            <a:gs pos="10000">
+              <a:schemeClr val="bg1">
+                <a:tint val="97000"/>
+                <a:hueMod val="92000"/>
+                <a:satMod val="169000"/>
+                <a:lumMod val="164000"/>
+              </a:schemeClr>
+            </a:gs>
+            <a:gs pos="100000">
+              <a:schemeClr val="bg1">
+                <a:shade val="96000"/>
+                <a:satMod val="120000"/>
+                <a:lumMod val="90000"/>
+              </a:schemeClr>
+            </a:gs>
+          </a:gsLst>
+          <a:lin ang="6120000" scaled="1"/>
+        </a:gradFill>
+        <a:effectLst/>
+      </p:bgPr>
+    </p:bg>
+    <p:spTree>
+      <p:nvGrpSpPr>
+        <p:cNvPr id="1" name=""/>
+        <p:cNvGrpSpPr/>
+        <p:nvPr/>
+      </p:nvGrpSpPr>
+      <p:grpSpPr>
+        <a:xfrm>
+          <a:off x="0" y="0"/>
+          <a:ext cx="0" cy="0"/>
+          <a:chOff x="0" y="0"/>
+          <a:chExt cx="0" cy="0"/>
+        </a:xfrm>
+      </p:grpSpPr>
+      <p:sp>
+        <p:nvSpPr>
+          <p:cNvPr id="2" name="Titel 1">
+            <a:extLst>
+              <a:ext uri="{FF2B5EF4-FFF2-40B4-BE49-F238E27FC236}">
+                <a16:creationId xmlns:a16="http://schemas.microsoft.com/office/drawing/2014/main" id="{301853B7-D914-4E5F-BFF2-9306DF25F055}"/>
+              </a:ext>
+            </a:extLst>
+          </p:cNvPr>
+          <p:cNvSpPr>
+            <a:spLocks noGrp="1"/>
+          </p:cNvSpPr>
+          <p:nvPr>
+            <p:ph type="title"/>
+          </p:nvPr>
+        </p:nvSpPr>
+        <p:spPr>
+          <a:xfrm>
+            <a:off x="684212" y="485244"/>
+            <a:ext cx="8534400" cy="1507067"/>
+          </a:xfrm>
+        </p:spPr>
+        <p:txBody>
+          <a:bodyPr>
+            <a:normAutofit/>
+          </a:bodyPr>
+          <a:lstStyle/>
+          <a:p>
+            <a:r>
+              <a:rPr lang="nl-NL" dirty="0"/>
+              <a:t>Rekenmachine code</a:t>
+            </a:r>
+          </a:p>
+        </p:txBody>
+      </p:sp>
+      <p:sp>
+        <p:nvSpPr>
+          <p:cNvPr id="3" name="Tijdelijke aanduiding voor inhoud 2">
+            <a:extLst>
+              <a:ext uri="{FF2B5EF4-FFF2-40B4-BE49-F238E27FC236}">
+                <a16:creationId xmlns:a16="http://schemas.microsoft.com/office/drawing/2014/main" id="{7DE5AE3C-2DC0-4B9F-9447-2831F8B1DDAA}"/>
+              </a:ext>
+            </a:extLst>
+          </p:cNvPr>
+          <p:cNvSpPr>
+            <a:spLocks noGrp="1"/>
+          </p:cNvSpPr>
+          <p:nvPr>
+            <p:ph idx="1"/>
+          </p:nvPr>
+        </p:nvSpPr>
+        <p:spPr>
+          <a:xfrm>
+            <a:off x="684212" y="2068511"/>
+            <a:ext cx="8534400" cy="3615267"/>
+          </a:xfrm>
+        </p:spPr>
+        <p:txBody>
+          <a:bodyPr anchor="t">
+            <a:normAutofit/>
+          </a:bodyPr>
+          <a:lstStyle/>
+          <a:p>
+            <a:pPr marL="0" indent="0">
+              <a:buNone/>
+            </a:pPr>
+            <a:r>
+              <a:rPr lang="nl-NL" dirty="0">
+                <a:solidFill>
+                  <a:schemeClr val="tx1"/>
+                </a:solidFill>
+              </a:rPr>
+              <a:t>Invoer</a:t>
+            </a:r>
+          </a:p>
+          <a:p>
+            <a:pPr marL="0" indent="0">
+              <a:buNone/>
+            </a:pPr>
+            <a:endParaRPr lang="nl-NL" dirty="0">
+              <a:solidFill>
+                <a:schemeClr val="tx1"/>
+              </a:solidFill>
+            </a:endParaRPr>
+          </a:p>
+          <a:p>
+            <a:pPr marL="0" indent="0">
+              <a:buNone/>
+            </a:pPr>
+            <a:endParaRPr lang="nl-NL" dirty="0">
+              <a:solidFill>
+                <a:schemeClr val="tx1"/>
+              </a:solidFill>
+            </a:endParaRPr>
+          </a:p>
+          <a:p>
+            <a:pPr marL="0" indent="0">
+              <a:buNone/>
+            </a:pPr>
+            <a:r>
+              <a:rPr lang="nl-NL" dirty="0">
+                <a:solidFill>
+                  <a:schemeClr val="tx1"/>
+                </a:solidFill>
+              </a:rPr>
+              <a:t>Getal 1, Getal 2</a:t>
+            </a:r>
+          </a:p>
+          <a:p>
+            <a:pPr marL="0" indent="0">
+              <a:buNone/>
+            </a:pPr>
+            <a:endParaRPr lang="nl-NL" dirty="0">
+              <a:solidFill>
+                <a:schemeClr val="tx1"/>
+              </a:solidFill>
+            </a:endParaRPr>
+          </a:p>
+          <a:p>
+            <a:pPr marL="0" indent="0">
+              <a:buNone/>
+            </a:pPr>
+            <a:endParaRPr lang="nl-NL" dirty="0">
+              <a:solidFill>
+                <a:schemeClr val="tx1"/>
+              </a:solidFill>
+            </a:endParaRPr>
+          </a:p>
+          <a:p>
+            <a:pPr marL="0" indent="0">
+              <a:buNone/>
+            </a:pPr>
+            <a:r>
+              <a:rPr lang="nl-NL" dirty="0">
+                <a:solidFill>
+                  <a:schemeClr val="tx1"/>
+                </a:solidFill>
+              </a:rPr>
+              <a:t>Operatie</a:t>
+            </a:r>
+          </a:p>
+          <a:p>
+            <a:pPr marL="0" indent="0">
+              <a:buNone/>
+            </a:pPr>
+            <a:endParaRPr lang="nl-NL" dirty="0">
+              <a:solidFill>
+                <a:schemeClr val="tx1"/>
+              </a:solidFill>
+            </a:endParaRPr>
+          </a:p>
+        </p:txBody>
+      </p:sp>
+      <p:pic>
+        <p:nvPicPr>
+          <p:cNvPr id="4" name="Afbeelding 3">
+            <a:extLst>
+              <a:ext uri="{FF2B5EF4-FFF2-40B4-BE49-F238E27FC236}">
+                <a16:creationId xmlns:a16="http://schemas.microsoft.com/office/drawing/2014/main" id="{45E7EFE5-E2D5-4EBB-BF05-B83AB4BF3E15}"/>
+              </a:ext>
+            </a:extLst>
+          </p:cNvPr>
+          <p:cNvPicPr>
+            <a:picLocks noChangeAspect="1"/>
+          </p:cNvPicPr>
+          <p:nvPr/>
+        </p:nvPicPr>
+        <p:blipFill>
+          <a:blip r:embed="rId2"/>
+          <a:stretch>
+            <a:fillRect/>
+          </a:stretch>
+        </p:blipFill>
+        <p:spPr>
+          <a:xfrm>
+            <a:off x="5049838" y="1992311"/>
+            <a:ext cx="6457950" cy="1047750"/>
+          </a:xfrm>
+          <a:prstGeom prst="rect">
+            <a:avLst/>
+          </a:prstGeom>
+        </p:spPr>
+      </p:pic>
+      <p:pic>
+        <p:nvPicPr>
+          <p:cNvPr id="5" name="Afbeelding 4">
+            <a:extLst>
+              <a:ext uri="{FF2B5EF4-FFF2-40B4-BE49-F238E27FC236}">
+                <a16:creationId xmlns:a16="http://schemas.microsoft.com/office/drawing/2014/main" id="{BAA2BA97-6EA6-45D3-82E4-18CF0974DB3C}"/>
+              </a:ext>
+            </a:extLst>
+          </p:cNvPr>
+          <p:cNvPicPr>
+            <a:picLocks noChangeAspect="1"/>
+          </p:cNvPicPr>
+          <p:nvPr/>
+        </p:nvPicPr>
+        <p:blipFill>
+          <a:blip r:embed="rId3"/>
+          <a:stretch>
+            <a:fillRect/>
+          </a:stretch>
+        </p:blipFill>
+        <p:spPr>
+          <a:xfrm>
+            <a:off x="5049838" y="3113090"/>
+            <a:ext cx="6057900" cy="1409700"/>
+          </a:xfrm>
+          <a:prstGeom prst="rect">
+            <a:avLst/>
+          </a:prstGeom>
+        </p:spPr>
+      </p:pic>
+      <p:pic>
+        <p:nvPicPr>
+          <p:cNvPr id="6" name="Afbeelding 5">
+            <a:extLst>
+              <a:ext uri="{FF2B5EF4-FFF2-40B4-BE49-F238E27FC236}">
+                <a16:creationId xmlns:a16="http://schemas.microsoft.com/office/drawing/2014/main" id="{26FAA126-E08F-4E01-855A-60B5DDE1BB12}"/>
+              </a:ext>
+            </a:extLst>
+          </p:cNvPr>
+          <p:cNvPicPr>
+            <a:picLocks noChangeAspect="1"/>
+          </p:cNvPicPr>
+          <p:nvPr/>
+        </p:nvPicPr>
+        <p:blipFill>
+          <a:blip r:embed="rId4"/>
+          <a:stretch>
+            <a:fillRect/>
+          </a:stretch>
+        </p:blipFill>
+        <p:spPr>
+          <a:xfrm>
+            <a:off x="5049838" y="4595819"/>
+            <a:ext cx="6153150" cy="1438275"/>
+          </a:xfrm>
+          <a:prstGeom prst="rect">
+            <a:avLst/>
+          </a:prstGeom>
+        </p:spPr>
+      </p:pic>
+    </p:spTree>
+    <p:extLst>
+      <p:ext uri="{BB962C8B-B14F-4D97-AF65-F5344CB8AC3E}">
+        <p14:creationId xmlns:p14="http://schemas.microsoft.com/office/powerpoint/2010/main" val="514134697"/>
+      </p:ext>
+    </p:extLst>
+  </p:cSld>
+  <p:clrMapOvr>
+    <a:masterClrMapping/>
+  </p:clrMapOvr>
+</p:sld>
+</file>
+
+<file path=ppt/slides/slide5.xml><?xml version="1.0" encoding="utf-8"?>
+<p:sld xmlns:a="http://schemas.openxmlformats.org/drawingml/2006/main" xmlns:r="http://schemas.openxmlformats.org/officeDocument/2006/relationships" xmlns:p="http://schemas.openxmlformats.org/presentationml/2006/main">
+  <p:cSld>
+    <p:bg>
+      <p:bgPr>
+        <a:gradFill rotWithShape="1">
+          <a:gsLst>
+            <a:gs pos="10000">
+              <a:schemeClr val="bg1">
+                <a:tint val="97000"/>
+                <a:hueMod val="92000"/>
+                <a:satMod val="169000"/>
+                <a:lumMod val="164000"/>
+              </a:schemeClr>
+            </a:gs>
+            <a:gs pos="100000">
+              <a:schemeClr val="bg1">
+                <a:shade val="96000"/>
+                <a:satMod val="120000"/>
+                <a:lumMod val="90000"/>
+              </a:schemeClr>
+            </a:gs>
+          </a:gsLst>
+          <a:lin ang="6120000" scaled="1"/>
+        </a:gradFill>
+        <a:effectLst/>
+      </p:bgPr>
+    </p:bg>
+    <p:spTree>
+      <p:nvGrpSpPr>
+        <p:cNvPr id="1" name=""/>
+        <p:cNvGrpSpPr/>
+        <p:nvPr/>
+      </p:nvGrpSpPr>
+      <p:grpSpPr>
+        <a:xfrm>
+          <a:off x="0" y="0"/>
+          <a:ext cx="0" cy="0"/>
+          <a:chOff x="0" y="0"/>
+          <a:chExt cx="0" cy="0"/>
+        </a:xfrm>
+      </p:grpSpPr>
+      <p:sp>
+        <p:nvSpPr>
+          <p:cNvPr id="2" name="Titel 1">
+            <a:extLst>
+              <a:ext uri="{FF2B5EF4-FFF2-40B4-BE49-F238E27FC236}">
+                <a16:creationId xmlns:a16="http://schemas.microsoft.com/office/drawing/2014/main" id="{301853B7-D914-4E5F-BFF2-9306DF25F055}"/>
+              </a:ext>
+            </a:extLst>
+          </p:cNvPr>
+          <p:cNvSpPr>
+            <a:spLocks noGrp="1"/>
+          </p:cNvSpPr>
+          <p:nvPr>
+            <p:ph type="title"/>
+          </p:nvPr>
+        </p:nvSpPr>
+        <p:spPr>
+          <a:xfrm>
+            <a:off x="684212" y="485244"/>
+            <a:ext cx="8534400" cy="1507067"/>
+          </a:xfrm>
+        </p:spPr>
+        <p:txBody>
+          <a:bodyPr>
+            <a:normAutofit/>
+          </a:bodyPr>
+          <a:lstStyle/>
+          <a:p>
+            <a:r>
+              <a:rPr lang="nl-NL" dirty="0"/>
+              <a:t>Rekenmachine code</a:t>
+            </a:r>
+          </a:p>
+        </p:txBody>
+      </p:sp>
+      <p:sp>
+        <p:nvSpPr>
+          <p:cNvPr id="3" name="Tijdelijke aanduiding voor inhoud 2">
+            <a:extLst>
+              <a:ext uri="{FF2B5EF4-FFF2-40B4-BE49-F238E27FC236}">
+                <a16:creationId xmlns:a16="http://schemas.microsoft.com/office/drawing/2014/main" id="{7DE5AE3C-2DC0-4B9F-9447-2831F8B1DDAA}"/>
+              </a:ext>
+            </a:extLst>
+          </p:cNvPr>
+          <p:cNvSpPr>
+            <a:spLocks noGrp="1"/>
+          </p:cNvSpPr>
+          <p:nvPr>
+            <p:ph idx="1"/>
+          </p:nvPr>
+        </p:nvSpPr>
+        <p:spPr>
+          <a:xfrm>
+            <a:off x="684212" y="2068511"/>
+            <a:ext cx="8534400" cy="3615267"/>
+          </a:xfrm>
+        </p:spPr>
+        <p:txBody>
+          <a:bodyPr anchor="t">
+            <a:normAutofit fontScale="92500" lnSpcReduction="10000"/>
+          </a:bodyPr>
+          <a:lstStyle/>
+          <a:p>
+            <a:pPr marL="0" indent="0">
+              <a:buNone/>
+            </a:pPr>
+            <a:r>
+              <a:rPr lang="nl-NL" dirty="0">
+                <a:solidFill>
+                  <a:schemeClr val="tx1"/>
+                </a:solidFill>
+              </a:rPr>
+              <a:t>Komma-knop</a:t>
+            </a:r>
+          </a:p>
+          <a:p>
+            <a:pPr marL="0" indent="0">
+              <a:buNone/>
+            </a:pPr>
+            <a:endParaRPr lang="nl-NL" dirty="0">
+              <a:solidFill>
+                <a:schemeClr val="tx1"/>
+              </a:solidFill>
+            </a:endParaRPr>
+          </a:p>
+          <a:p>
+            <a:pPr marL="0" indent="0">
+              <a:buNone/>
+            </a:pPr>
+            <a:endParaRPr lang="nl-NL" dirty="0">
+              <a:solidFill>
+                <a:schemeClr val="tx1"/>
+              </a:solidFill>
+            </a:endParaRPr>
+          </a:p>
+          <a:p>
+            <a:pPr marL="0" indent="0">
+              <a:buNone/>
+            </a:pPr>
+            <a:endParaRPr lang="nl-NL" dirty="0">
+              <a:solidFill>
+                <a:schemeClr val="tx1"/>
+              </a:solidFill>
+            </a:endParaRPr>
+          </a:p>
+          <a:p>
+            <a:pPr marL="0" indent="0">
+              <a:buNone/>
+            </a:pPr>
+            <a:r>
+              <a:rPr lang="nl-NL" dirty="0">
+                <a:solidFill>
+                  <a:schemeClr val="tx1"/>
+                </a:solidFill>
+              </a:rPr>
+              <a:t>Is-knop</a:t>
+            </a:r>
+          </a:p>
+          <a:p>
+            <a:pPr marL="0" indent="0">
+              <a:buNone/>
+            </a:pPr>
+            <a:endParaRPr lang="nl-NL" dirty="0">
+              <a:solidFill>
+                <a:schemeClr val="tx1"/>
+              </a:solidFill>
+            </a:endParaRPr>
+          </a:p>
+          <a:p>
+            <a:pPr marL="0" indent="0">
+              <a:buNone/>
+            </a:pPr>
+            <a:endParaRPr lang="nl-NL" dirty="0">
+              <a:solidFill>
+                <a:schemeClr val="tx1"/>
+              </a:solidFill>
+            </a:endParaRPr>
+          </a:p>
+          <a:p>
+            <a:pPr marL="0" indent="0">
+              <a:buNone/>
+            </a:pPr>
+            <a:endParaRPr lang="nl-NL" dirty="0">
+              <a:solidFill>
+                <a:schemeClr val="tx1"/>
+              </a:solidFill>
+            </a:endParaRPr>
+          </a:p>
+          <a:p>
+            <a:pPr marL="0" indent="0">
+              <a:buNone/>
+            </a:pPr>
+            <a:r>
+              <a:rPr lang="nl-NL" dirty="0">
+                <a:solidFill>
+                  <a:schemeClr val="tx1"/>
+                </a:solidFill>
+              </a:rPr>
+              <a:t>Operatie</a:t>
+            </a:r>
+          </a:p>
+        </p:txBody>
+      </p:sp>
+      <p:pic>
+        <p:nvPicPr>
+          <p:cNvPr id="7" name="Afbeelding 6">
+            <a:extLst>
+              <a:ext uri="{FF2B5EF4-FFF2-40B4-BE49-F238E27FC236}">
+                <a16:creationId xmlns:a16="http://schemas.microsoft.com/office/drawing/2014/main" id="{D3039194-2D54-43E0-99E9-4D46D37FE1B2}"/>
+              </a:ext>
+            </a:extLst>
+          </p:cNvPr>
+          <p:cNvPicPr>
+            <a:picLocks noChangeAspect="1"/>
+          </p:cNvPicPr>
+          <p:nvPr/>
+        </p:nvPicPr>
+        <p:blipFill>
+          <a:blip r:embed="rId2"/>
+          <a:stretch>
+            <a:fillRect/>
+          </a:stretch>
+        </p:blipFill>
+        <p:spPr>
+          <a:xfrm>
+            <a:off x="6096000" y="3429000"/>
+            <a:ext cx="3409950" cy="1076325"/>
+          </a:xfrm>
+          <a:prstGeom prst="rect">
+            <a:avLst/>
+          </a:prstGeom>
+        </p:spPr>
+      </p:pic>
+      <p:pic>
+        <p:nvPicPr>
+          <p:cNvPr id="8" name="Afbeelding 7">
+            <a:extLst>
+              <a:ext uri="{FF2B5EF4-FFF2-40B4-BE49-F238E27FC236}">
+                <a16:creationId xmlns:a16="http://schemas.microsoft.com/office/drawing/2014/main" id="{8F1F560F-C264-4BB1-B99B-14BE73AB9BB2}"/>
+              </a:ext>
+            </a:extLst>
+          </p:cNvPr>
+          <p:cNvPicPr>
+            <a:picLocks noChangeAspect="1"/>
+          </p:cNvPicPr>
+          <p:nvPr/>
+        </p:nvPicPr>
+        <p:blipFill>
+          <a:blip r:embed="rId3"/>
+          <a:stretch>
+            <a:fillRect/>
+          </a:stretch>
+        </p:blipFill>
+        <p:spPr>
+          <a:xfrm>
+            <a:off x="6096000" y="2068511"/>
+            <a:ext cx="2333625" cy="857250"/>
+          </a:xfrm>
+          <a:prstGeom prst="rect">
+            <a:avLst/>
+          </a:prstGeom>
+        </p:spPr>
+      </p:pic>
+      <p:pic>
+        <p:nvPicPr>
+          <p:cNvPr id="9" name="Afbeelding 8">
+            <a:extLst>
+              <a:ext uri="{FF2B5EF4-FFF2-40B4-BE49-F238E27FC236}">
+                <a16:creationId xmlns:a16="http://schemas.microsoft.com/office/drawing/2014/main" id="{6CC45AFF-C76F-48C2-86AE-2DE91A9DD140}"/>
+              </a:ext>
+            </a:extLst>
+          </p:cNvPr>
+          <p:cNvPicPr>
+            <a:picLocks noChangeAspect="1"/>
+          </p:cNvPicPr>
+          <p:nvPr/>
+        </p:nvPicPr>
+        <p:blipFill>
+          <a:blip r:embed="rId4"/>
+          <a:stretch>
+            <a:fillRect/>
+          </a:stretch>
+        </p:blipFill>
+        <p:spPr>
+          <a:xfrm>
+            <a:off x="6096000" y="5008564"/>
+            <a:ext cx="3657600" cy="1057275"/>
+          </a:xfrm>
+          <a:prstGeom prst="rect">
+            <a:avLst/>
+          </a:prstGeom>
+        </p:spPr>
+      </p:pic>
+    </p:spTree>
+    <p:extLst>
+      <p:ext uri="{BB962C8B-B14F-4D97-AF65-F5344CB8AC3E}">
+        <p14:creationId xmlns:p14="http://schemas.microsoft.com/office/powerpoint/2010/main" val="852697815"/>
+      </p:ext>
+    </p:extLst>
+  </p:cSld>
+  <p:clrMapOvr>
+    <a:masterClrMapping/>
+  </p:clrMapOvr>
+</p:sld>
+</file>
+
 <file path=ppt/theme/theme1.xml><?xml version="1.0" encoding="utf-8"?>
 <a:theme xmlns:a="http://schemas.openxmlformats.org/drawingml/2006/main" name="Segment">
   <a:themeElements>

</xml_diff>

<commit_message>
Code geordend en comments geplaatst
</commit_message>
<xml_diff>
--- a/PowerPoint.pptx
+++ b/PowerPoint.pptx
@@ -307,7 +307,7 @@
           <a:p>
             <a:fld id="{4EC87238-8AE5-4254-B341-F7F1A060BE88}" type="datetimeFigureOut">
               <a:rPr lang="nl-NL" smtClean="0"/>
-              <a:t>15-12-2019</a:t>
+              <a:t>16-12-2019</a:t>
             </a:fld>
             <a:endParaRPr lang="nl-NL"/>
           </a:p>
@@ -743,7 +743,7 @@
           <a:p>
             <a:fld id="{4EC87238-8AE5-4254-B341-F7F1A060BE88}" type="datetimeFigureOut">
               <a:rPr lang="nl-NL" smtClean="0"/>
-              <a:t>15-12-2019</a:t>
+              <a:t>16-12-2019</a:t>
             </a:fld>
             <a:endParaRPr lang="nl-NL"/>
           </a:p>
@@ -993,7 +993,7 @@
           <a:p>
             <a:fld id="{4EC87238-8AE5-4254-B341-F7F1A060BE88}" type="datetimeFigureOut">
               <a:rPr lang="nl-NL" smtClean="0"/>
-              <a:t>15-12-2019</a:t>
+              <a:t>16-12-2019</a:t>
             </a:fld>
             <a:endParaRPr lang="nl-NL"/>
           </a:p>
@@ -1301,7 +1301,7 @@
           <a:p>
             <a:fld id="{4EC87238-8AE5-4254-B341-F7F1A060BE88}" type="datetimeFigureOut">
               <a:rPr lang="nl-NL" smtClean="0"/>
-              <a:t>15-12-2019</a:t>
+              <a:t>16-12-2019</a:t>
             </a:fld>
             <a:endParaRPr lang="nl-NL"/>
           </a:p>
@@ -1619,7 +1619,7 @@
           <a:p>
             <a:fld id="{4EC87238-8AE5-4254-B341-F7F1A060BE88}" type="datetimeFigureOut">
               <a:rPr lang="nl-NL" smtClean="0"/>
-              <a:t>15-12-2019</a:t>
+              <a:t>16-12-2019</a:t>
             </a:fld>
             <a:endParaRPr lang="nl-NL"/>
           </a:p>
@@ -1921,7 +1921,7 @@
           <a:p>
             <a:fld id="{4EC87238-8AE5-4254-B341-F7F1A060BE88}" type="datetimeFigureOut">
               <a:rPr lang="nl-NL" smtClean="0"/>
-              <a:t>15-12-2019</a:t>
+              <a:t>16-12-2019</a:t>
             </a:fld>
             <a:endParaRPr lang="nl-NL"/>
           </a:p>
@@ -2288,7 +2288,7 @@
           <a:p>
             <a:fld id="{4EC87238-8AE5-4254-B341-F7F1A060BE88}" type="datetimeFigureOut">
               <a:rPr lang="nl-NL" smtClean="0"/>
-              <a:t>15-12-2019</a:t>
+              <a:t>16-12-2019</a:t>
             </a:fld>
             <a:endParaRPr lang="nl-NL"/>
           </a:p>
@@ -2462,7 +2462,7 @@
           <a:p>
             <a:fld id="{4EC87238-8AE5-4254-B341-F7F1A060BE88}" type="datetimeFigureOut">
               <a:rPr lang="nl-NL" smtClean="0"/>
-              <a:t>15-12-2019</a:t>
+              <a:t>16-12-2019</a:t>
             </a:fld>
             <a:endParaRPr lang="nl-NL"/>
           </a:p>
@@ -2642,7 +2642,7 @@
           <a:p>
             <a:fld id="{4EC87238-8AE5-4254-B341-F7F1A060BE88}" type="datetimeFigureOut">
               <a:rPr lang="nl-NL" smtClean="0"/>
-              <a:t>15-12-2019</a:t>
+              <a:t>16-12-2019</a:t>
             </a:fld>
             <a:endParaRPr lang="nl-NL"/>
           </a:p>
@@ -2812,7 +2812,7 @@
           <a:p>
             <a:fld id="{4EC87238-8AE5-4254-B341-F7F1A060BE88}" type="datetimeFigureOut">
               <a:rPr lang="nl-NL" smtClean="0"/>
-              <a:t>15-12-2019</a:t>
+              <a:t>16-12-2019</a:t>
             </a:fld>
             <a:endParaRPr lang="nl-NL"/>
           </a:p>
@@ -3062,7 +3062,7 @@
           <a:p>
             <a:fld id="{4EC87238-8AE5-4254-B341-F7F1A060BE88}" type="datetimeFigureOut">
               <a:rPr lang="nl-NL" smtClean="0"/>
-              <a:t>15-12-2019</a:t>
+              <a:t>16-12-2019</a:t>
             </a:fld>
             <a:endParaRPr lang="nl-NL"/>
           </a:p>
@@ -3298,7 +3298,7 @@
           <a:p>
             <a:fld id="{4EC87238-8AE5-4254-B341-F7F1A060BE88}" type="datetimeFigureOut">
               <a:rPr lang="nl-NL" smtClean="0"/>
-              <a:t>15-12-2019</a:t>
+              <a:t>16-12-2019</a:t>
             </a:fld>
             <a:endParaRPr lang="nl-NL"/>
           </a:p>
@@ -3680,7 +3680,7 @@
           <a:p>
             <a:fld id="{4EC87238-8AE5-4254-B341-F7F1A060BE88}" type="datetimeFigureOut">
               <a:rPr lang="nl-NL" smtClean="0"/>
-              <a:t>15-12-2019</a:t>
+              <a:t>16-12-2019</a:t>
             </a:fld>
             <a:endParaRPr lang="nl-NL"/>
           </a:p>
@@ -3798,7 +3798,7 @@
           <a:p>
             <a:fld id="{4EC87238-8AE5-4254-B341-F7F1A060BE88}" type="datetimeFigureOut">
               <a:rPr lang="nl-NL" smtClean="0"/>
-              <a:t>15-12-2019</a:t>
+              <a:t>16-12-2019</a:t>
             </a:fld>
             <a:endParaRPr lang="nl-NL"/>
           </a:p>
@@ -3893,7 +3893,7 @@
           <a:p>
             <a:fld id="{4EC87238-8AE5-4254-B341-F7F1A060BE88}" type="datetimeFigureOut">
               <a:rPr lang="nl-NL" smtClean="0"/>
-              <a:t>15-12-2019</a:t>
+              <a:t>16-12-2019</a:t>
             </a:fld>
             <a:endParaRPr lang="nl-NL"/>
           </a:p>
@@ -4148,7 +4148,7 @@
           <a:p>
             <a:fld id="{4EC87238-8AE5-4254-B341-F7F1A060BE88}" type="datetimeFigureOut">
               <a:rPr lang="nl-NL" smtClean="0"/>
-              <a:t>15-12-2019</a:t>
+              <a:t>16-12-2019</a:t>
             </a:fld>
             <a:endParaRPr lang="nl-NL"/>
           </a:p>
@@ -4431,7 +4431,7 @@
           <a:p>
             <a:fld id="{4EC87238-8AE5-4254-B341-F7F1A060BE88}" type="datetimeFigureOut">
               <a:rPr lang="nl-NL" smtClean="0"/>
-              <a:t>15-12-2019</a:t>
+              <a:t>16-12-2019</a:t>
             </a:fld>
             <a:endParaRPr lang="nl-NL"/>
           </a:p>
@@ -4837,7 +4837,7 @@
           <a:p>
             <a:fld id="{4EC87238-8AE5-4254-B341-F7F1A060BE88}" type="datetimeFigureOut">
               <a:rPr lang="nl-NL" smtClean="0"/>
-              <a:t>15-12-2019</a:t>
+              <a:t>16-12-2019</a:t>
             </a:fld>
             <a:endParaRPr lang="nl-NL"/>
           </a:p>
@@ -5489,18 +5489,22 @@
                   </a:schemeClr>
                 </a:solidFill>
               </a:rPr>
-              <a:t>Jesse </a:t>
-            </a:r>
-            <a:r>
-              <a:rPr lang="nl-NL" dirty="0" err="1">
+              <a:t>Jesse Overveld			Sam Elfring</a:t>
+            </a:r>
+          </a:p>
+          <a:p>
+            <a:r>
+              <a:rPr lang="nl-NL" dirty="0">
                 <a:solidFill>
                   <a:schemeClr val="tx2">
                     <a:lumMod val="75000"/>
                   </a:schemeClr>
                 </a:solidFill>
               </a:rPr>
-              <a:t>Overveld</a:t>
-            </a:r>
+              <a:t>Lucas Huls					Bram van Nek</a:t>
+            </a:r>
+          </a:p>
+          <a:p>
             <a:r>
               <a:rPr lang="nl-NL" dirty="0">
                 <a:solidFill>
@@ -5509,41 +5513,7 @@
                   </a:schemeClr>
                 </a:solidFill>
               </a:rPr>
-              <a:t>			Sam Elfring</a:t>
-            </a:r>
-          </a:p>
-          <a:p>
-            <a:r>
-              <a:rPr lang="nl-NL" dirty="0">
-                <a:solidFill>
-                  <a:schemeClr val="tx2">
-                    <a:lumMod val="75000"/>
-                  </a:schemeClr>
-                </a:solidFill>
-              </a:rPr>
-              <a:t>Lucas Huls					Bram van Nek</a:t>
-            </a:r>
-          </a:p>
-          <a:p>
-            <a:r>
-              <a:rPr lang="nl-NL" dirty="0" err="1">
-                <a:solidFill>
-                  <a:schemeClr val="tx2">
-                    <a:lumMod val="75000"/>
-                  </a:schemeClr>
-                </a:solidFill>
-              </a:rPr>
-              <a:t>Jullian</a:t>
-            </a:r>
-            <a:r>
-              <a:rPr lang="nl-NL" dirty="0">
-                <a:solidFill>
-                  <a:schemeClr val="tx2">
-                    <a:lumMod val="75000"/>
-                  </a:schemeClr>
-                </a:solidFill>
-              </a:rPr>
-              <a:t> Moreno </a:t>
+              <a:t>Jullian Moreno </a:t>
             </a:r>
           </a:p>
         </p:txBody>
@@ -5682,6 +5652,31 @@
                   <a:schemeClr val="tx1"/>
                 </a:solidFill>
               </a:rPr>
+              <a:t>Ontwerp</a:t>
+            </a:r>
+          </a:p>
+          <a:p>
+            <a:r>
+              <a:rPr lang="nl-NL">
+                <a:solidFill>
+                  <a:schemeClr val="tx1"/>
+                </a:solidFill>
+              </a:rPr>
+              <a:t>GitHub</a:t>
+            </a:r>
+            <a:endParaRPr lang="nl-NL" dirty="0">
+              <a:solidFill>
+                <a:schemeClr val="tx1"/>
+              </a:solidFill>
+            </a:endParaRPr>
+          </a:p>
+          <a:p>
+            <a:r>
+              <a:rPr lang="nl-NL" dirty="0">
+                <a:solidFill>
+                  <a:schemeClr val="tx1"/>
+                </a:solidFill>
+              </a:rPr>
               <a:t>Sprints</a:t>
             </a:r>
           </a:p>
@@ -5692,7 +5687,7 @@
                   <a:schemeClr val="tx1"/>
                 </a:solidFill>
               </a:rPr>
-              <a:t>Ontwerp</a:t>
+              <a:t>Rekenmachine code</a:t>
             </a:r>
           </a:p>
           <a:p>
@@ -5703,26 +5698,6 @@
                 </a:solidFill>
               </a:rPr>
               <a:t>Taakverdeling</a:t>
-            </a:r>
-          </a:p>
-          <a:p>
-            <a:r>
-              <a:rPr lang="nl-NL" dirty="0">
-                <a:solidFill>
-                  <a:schemeClr val="tx1"/>
-                </a:solidFill>
-              </a:rPr>
-              <a:t>Rekenmachine code</a:t>
-            </a:r>
-          </a:p>
-          <a:p>
-            <a:r>
-              <a:rPr lang="nl-NL" dirty="0">
-                <a:solidFill>
-                  <a:schemeClr val="tx1"/>
-                </a:solidFill>
-              </a:rPr>
-              <a:t>GitHub</a:t>
             </a:r>
           </a:p>
           <a:p>

</xml_diff>

<commit_message>
Tekst en Powerpoint geupdated
</commit_message>
<xml_diff>
--- a/PowerPoint.pptx
+++ b/PowerPoint.pptx
@@ -10,6 +10,8 @@
     <p:sldId id="258" r:id="rId4"/>
     <p:sldId id="259" r:id="rId5"/>
     <p:sldId id="260" r:id="rId6"/>
+    <p:sldId id="261" r:id="rId7"/>
+    <p:sldId id="262" r:id="rId8"/>
   </p:sldIdLst>
   <p:sldSz cx="12192000" cy="6858000"/>
   <p:notesSz cx="6858000" cy="9144000"/>
@@ -7979,6 +7981,683 @@
 </p:sld>
 </file>
 
+<file path=ppt/slides/slide6.xml><?xml version="1.0" encoding="utf-8"?>
+<p:sld xmlns:a="http://schemas.openxmlformats.org/drawingml/2006/main" xmlns:r="http://schemas.openxmlformats.org/officeDocument/2006/relationships" xmlns:p="http://schemas.openxmlformats.org/presentationml/2006/main">
+  <p:cSld>
+    <p:bg>
+      <p:bgPr>
+        <a:gradFill rotWithShape="1">
+          <a:gsLst>
+            <a:gs pos="10000">
+              <a:schemeClr val="bg1">
+                <a:tint val="97000"/>
+                <a:hueMod val="92000"/>
+                <a:satMod val="169000"/>
+                <a:lumMod val="164000"/>
+              </a:schemeClr>
+            </a:gs>
+            <a:gs pos="100000">
+              <a:schemeClr val="bg1">
+                <a:shade val="96000"/>
+                <a:satMod val="120000"/>
+                <a:lumMod val="90000"/>
+              </a:schemeClr>
+            </a:gs>
+          </a:gsLst>
+          <a:lin ang="6120000" scaled="1"/>
+        </a:gradFill>
+        <a:effectLst/>
+      </p:bgPr>
+    </p:bg>
+    <p:spTree>
+      <p:nvGrpSpPr>
+        <p:cNvPr id="1" name=""/>
+        <p:cNvGrpSpPr/>
+        <p:nvPr/>
+      </p:nvGrpSpPr>
+      <p:grpSpPr>
+        <a:xfrm>
+          <a:off x="0" y="0"/>
+          <a:ext cx="0" cy="0"/>
+          <a:chOff x="0" y="0"/>
+          <a:chExt cx="0" cy="0"/>
+        </a:xfrm>
+      </p:grpSpPr>
+      <p:sp>
+        <p:nvSpPr>
+          <p:cNvPr id="2" name="Titel 1">
+            <a:extLst>
+              <a:ext uri="{FF2B5EF4-FFF2-40B4-BE49-F238E27FC236}">
+                <a16:creationId xmlns:a16="http://schemas.microsoft.com/office/drawing/2014/main" id="{301853B7-D914-4E5F-BFF2-9306DF25F055}"/>
+              </a:ext>
+            </a:extLst>
+          </p:cNvPr>
+          <p:cNvSpPr>
+            <a:spLocks noGrp="1"/>
+          </p:cNvSpPr>
+          <p:nvPr>
+            <p:ph type="title"/>
+          </p:nvPr>
+        </p:nvSpPr>
+        <p:spPr>
+          <a:xfrm>
+            <a:off x="684212" y="485244"/>
+            <a:ext cx="8534400" cy="1507067"/>
+          </a:xfrm>
+        </p:spPr>
+        <p:txBody>
+          <a:bodyPr>
+            <a:normAutofit/>
+          </a:bodyPr>
+          <a:lstStyle/>
+          <a:p>
+            <a:r>
+              <a:rPr lang="nl-NL" dirty="0"/>
+              <a:t>Rekenmachine code</a:t>
+            </a:r>
+          </a:p>
+        </p:txBody>
+      </p:sp>
+      <p:sp>
+        <p:nvSpPr>
+          <p:cNvPr id="3" name="Tijdelijke aanduiding voor inhoud 2">
+            <a:extLst>
+              <a:ext uri="{FF2B5EF4-FFF2-40B4-BE49-F238E27FC236}">
+                <a16:creationId xmlns:a16="http://schemas.microsoft.com/office/drawing/2014/main" id="{7DE5AE3C-2DC0-4B9F-9447-2831F8B1DDAA}"/>
+              </a:ext>
+            </a:extLst>
+          </p:cNvPr>
+          <p:cNvSpPr>
+            <a:spLocks noGrp="1"/>
+          </p:cNvSpPr>
+          <p:nvPr>
+            <p:ph idx="1"/>
+          </p:nvPr>
+        </p:nvSpPr>
+        <p:spPr>
+          <a:xfrm>
+            <a:off x="684212" y="2068511"/>
+            <a:ext cx="8534400" cy="3615267"/>
+          </a:xfrm>
+        </p:spPr>
+        <p:txBody>
+          <a:bodyPr anchor="t">
+            <a:normAutofit/>
+          </a:bodyPr>
+          <a:lstStyle/>
+          <a:p>
+            <a:pPr marL="0" indent="0">
+              <a:buNone/>
+            </a:pPr>
+            <a:r>
+              <a:rPr lang="nl-NL" dirty="0">
+                <a:solidFill>
+                  <a:schemeClr val="tx1"/>
+                </a:solidFill>
+              </a:rPr>
+              <a:t>Speciale knoppen</a:t>
+            </a:r>
+          </a:p>
+          <a:p>
+            <a:pPr marL="0" indent="0">
+              <a:buNone/>
+            </a:pPr>
+            <a:endParaRPr lang="nl-NL" dirty="0">
+              <a:solidFill>
+                <a:schemeClr val="tx1"/>
+              </a:solidFill>
+            </a:endParaRPr>
+          </a:p>
+          <a:p>
+            <a:pPr marL="0" indent="0">
+              <a:buNone/>
+            </a:pPr>
+            <a:r>
+              <a:rPr lang="nl-NL" dirty="0">
+                <a:solidFill>
+                  <a:schemeClr val="tx1"/>
+                </a:solidFill>
+              </a:rPr>
+              <a:t>Binair</a:t>
+            </a:r>
+          </a:p>
+          <a:p>
+            <a:pPr marL="0" indent="0">
+              <a:buNone/>
+            </a:pPr>
+            <a:endParaRPr lang="nl-NL" dirty="0">
+              <a:solidFill>
+                <a:schemeClr val="tx1"/>
+              </a:solidFill>
+            </a:endParaRPr>
+          </a:p>
+          <a:p>
+            <a:pPr marL="0" indent="0">
+              <a:buNone/>
+            </a:pPr>
+            <a:r>
+              <a:rPr lang="nl-NL" dirty="0">
+                <a:solidFill>
+                  <a:schemeClr val="tx1"/>
+                </a:solidFill>
+              </a:rPr>
+              <a:t>Hexadecimaal</a:t>
+            </a:r>
+          </a:p>
+          <a:p>
+            <a:pPr marL="0" indent="0">
+              <a:buNone/>
+            </a:pPr>
+            <a:endParaRPr lang="nl-NL" dirty="0">
+              <a:solidFill>
+                <a:schemeClr val="tx1"/>
+              </a:solidFill>
+            </a:endParaRPr>
+          </a:p>
+          <a:p>
+            <a:pPr marL="0" indent="0">
+              <a:buNone/>
+            </a:pPr>
+            <a:r>
+              <a:rPr lang="nl-NL" dirty="0">
+                <a:solidFill>
+                  <a:schemeClr val="tx1"/>
+                </a:solidFill>
+              </a:rPr>
+              <a:t>EUR/DOL</a:t>
+            </a:r>
+          </a:p>
+        </p:txBody>
+      </p:sp>
+      <p:pic>
+        <p:nvPicPr>
+          <p:cNvPr id="4" name="Afbeelding 3">
+            <a:extLst>
+              <a:ext uri="{FF2B5EF4-FFF2-40B4-BE49-F238E27FC236}">
+                <a16:creationId xmlns:a16="http://schemas.microsoft.com/office/drawing/2014/main" id="{CC799693-4A0F-4988-AFEA-983B6A4012B0}"/>
+              </a:ext>
+            </a:extLst>
+          </p:cNvPr>
+          <p:cNvPicPr>
+            <a:picLocks noChangeAspect="1"/>
+          </p:cNvPicPr>
+          <p:nvPr/>
+        </p:nvPicPr>
+        <p:blipFill>
+          <a:blip r:embed="rId2"/>
+          <a:stretch>
+            <a:fillRect/>
+          </a:stretch>
+        </p:blipFill>
+        <p:spPr>
+          <a:xfrm>
+            <a:off x="4467225" y="2752725"/>
+            <a:ext cx="7724775" cy="676275"/>
+          </a:xfrm>
+          <a:prstGeom prst="rect">
+            <a:avLst/>
+          </a:prstGeom>
+        </p:spPr>
+      </p:pic>
+      <p:pic>
+        <p:nvPicPr>
+          <p:cNvPr id="5" name="Afbeelding 4">
+            <a:extLst>
+              <a:ext uri="{FF2B5EF4-FFF2-40B4-BE49-F238E27FC236}">
+                <a16:creationId xmlns:a16="http://schemas.microsoft.com/office/drawing/2014/main" id="{6CC5CF93-8D48-4D3A-9C10-036516D5E261}"/>
+              </a:ext>
+            </a:extLst>
+          </p:cNvPr>
+          <p:cNvPicPr>
+            <a:picLocks noChangeAspect="1"/>
+          </p:cNvPicPr>
+          <p:nvPr/>
+        </p:nvPicPr>
+        <p:blipFill>
+          <a:blip r:embed="rId3"/>
+          <a:stretch>
+            <a:fillRect/>
+          </a:stretch>
+        </p:blipFill>
+        <p:spPr>
+          <a:xfrm>
+            <a:off x="4467225" y="3876144"/>
+            <a:ext cx="5133975" cy="428625"/>
+          </a:xfrm>
+          <a:prstGeom prst="rect">
+            <a:avLst/>
+          </a:prstGeom>
+        </p:spPr>
+      </p:pic>
+      <p:pic>
+        <p:nvPicPr>
+          <p:cNvPr id="6" name="Afbeelding 5">
+            <a:extLst>
+              <a:ext uri="{FF2B5EF4-FFF2-40B4-BE49-F238E27FC236}">
+                <a16:creationId xmlns:a16="http://schemas.microsoft.com/office/drawing/2014/main" id="{A0997212-2063-46BB-B514-B921D9DC9774}"/>
+              </a:ext>
+            </a:extLst>
+          </p:cNvPr>
+          <p:cNvPicPr>
+            <a:picLocks noChangeAspect="1"/>
+          </p:cNvPicPr>
+          <p:nvPr/>
+        </p:nvPicPr>
+        <p:blipFill>
+          <a:blip r:embed="rId4"/>
+          <a:stretch>
+            <a:fillRect/>
+          </a:stretch>
+        </p:blipFill>
+        <p:spPr>
+          <a:xfrm>
+            <a:off x="4467225" y="4751913"/>
+            <a:ext cx="3514725" cy="704850"/>
+          </a:xfrm>
+          <a:prstGeom prst="rect">
+            <a:avLst/>
+          </a:prstGeom>
+        </p:spPr>
+      </p:pic>
+    </p:spTree>
+    <p:extLst>
+      <p:ext uri="{BB962C8B-B14F-4D97-AF65-F5344CB8AC3E}">
+        <p14:creationId xmlns:p14="http://schemas.microsoft.com/office/powerpoint/2010/main" val="124031581"/>
+      </p:ext>
+    </p:extLst>
+  </p:cSld>
+  <p:clrMapOvr>
+    <a:masterClrMapping/>
+  </p:clrMapOvr>
+</p:sld>
+</file>
+
+<file path=ppt/slides/slide7.xml><?xml version="1.0" encoding="utf-8"?>
+<p:sld xmlns:a="http://schemas.openxmlformats.org/drawingml/2006/main" xmlns:r="http://schemas.openxmlformats.org/officeDocument/2006/relationships" xmlns:p="http://schemas.openxmlformats.org/presentationml/2006/main">
+  <p:cSld>
+    <p:bg>
+      <p:bgPr>
+        <a:gradFill rotWithShape="1">
+          <a:gsLst>
+            <a:gs pos="10000">
+              <a:schemeClr val="bg1">
+                <a:tint val="97000"/>
+                <a:hueMod val="92000"/>
+                <a:satMod val="169000"/>
+                <a:lumMod val="164000"/>
+              </a:schemeClr>
+            </a:gs>
+            <a:gs pos="100000">
+              <a:schemeClr val="bg1">
+                <a:shade val="96000"/>
+                <a:satMod val="120000"/>
+                <a:lumMod val="90000"/>
+              </a:schemeClr>
+            </a:gs>
+          </a:gsLst>
+          <a:lin ang="6120000" scaled="1"/>
+        </a:gradFill>
+        <a:effectLst/>
+      </p:bgPr>
+    </p:bg>
+    <p:spTree>
+      <p:nvGrpSpPr>
+        <p:cNvPr id="1" name=""/>
+        <p:cNvGrpSpPr/>
+        <p:nvPr/>
+      </p:nvGrpSpPr>
+      <p:grpSpPr>
+        <a:xfrm>
+          <a:off x="0" y="0"/>
+          <a:ext cx="0" cy="0"/>
+          <a:chOff x="0" y="0"/>
+          <a:chExt cx="0" cy="0"/>
+        </a:xfrm>
+      </p:grpSpPr>
+      <p:sp>
+        <p:nvSpPr>
+          <p:cNvPr id="2" name="Titel 1">
+            <a:extLst>
+              <a:ext uri="{FF2B5EF4-FFF2-40B4-BE49-F238E27FC236}">
+                <a16:creationId xmlns:a16="http://schemas.microsoft.com/office/drawing/2014/main" id="{301853B7-D914-4E5F-BFF2-9306DF25F055}"/>
+              </a:ext>
+            </a:extLst>
+          </p:cNvPr>
+          <p:cNvSpPr>
+            <a:spLocks noGrp="1"/>
+          </p:cNvSpPr>
+          <p:nvPr>
+            <p:ph type="title"/>
+          </p:nvPr>
+        </p:nvSpPr>
+        <p:spPr>
+          <a:xfrm>
+            <a:off x="684212" y="485244"/>
+            <a:ext cx="8534400" cy="1507067"/>
+          </a:xfrm>
+        </p:spPr>
+        <p:txBody>
+          <a:bodyPr>
+            <a:normAutofit/>
+          </a:bodyPr>
+          <a:lstStyle/>
+          <a:p>
+            <a:r>
+              <a:rPr lang="nl-NL" dirty="0"/>
+              <a:t>Gezichtsherkenning</a:t>
+            </a:r>
+          </a:p>
+        </p:txBody>
+      </p:sp>
+      <p:sp>
+        <p:nvSpPr>
+          <p:cNvPr id="3" name="Tijdelijke aanduiding voor inhoud 2">
+            <a:extLst>
+              <a:ext uri="{FF2B5EF4-FFF2-40B4-BE49-F238E27FC236}">
+                <a16:creationId xmlns:a16="http://schemas.microsoft.com/office/drawing/2014/main" id="{7DE5AE3C-2DC0-4B9F-9447-2831F8B1DDAA}"/>
+              </a:ext>
+            </a:extLst>
+          </p:cNvPr>
+          <p:cNvSpPr>
+            <a:spLocks noGrp="1"/>
+          </p:cNvSpPr>
+          <p:nvPr>
+            <p:ph idx="1"/>
+          </p:nvPr>
+        </p:nvSpPr>
+        <p:spPr>
+          <a:xfrm>
+            <a:off x="684212" y="2068511"/>
+            <a:ext cx="8534400" cy="3615267"/>
+          </a:xfrm>
+        </p:spPr>
+        <p:txBody>
+          <a:bodyPr anchor="t">
+            <a:normAutofit/>
+          </a:bodyPr>
+          <a:lstStyle/>
+          <a:p>
+            <a:pPr marL="0" indent="0">
+              <a:buNone/>
+            </a:pPr>
+            <a:r>
+              <a:rPr lang="nl-NL" dirty="0">
+                <a:solidFill>
+                  <a:schemeClr val="tx1"/>
+                </a:solidFill>
+              </a:rPr>
+              <a:t>Knoppen</a:t>
+            </a:r>
+          </a:p>
+          <a:p>
+            <a:pPr marL="0" indent="0">
+              <a:buNone/>
+            </a:pPr>
+            <a:endParaRPr lang="nl-NL" dirty="0">
+              <a:solidFill>
+                <a:schemeClr val="tx1"/>
+              </a:solidFill>
+            </a:endParaRPr>
+          </a:p>
+          <a:p>
+            <a:pPr marL="0" indent="0">
+              <a:buNone/>
+            </a:pPr>
+            <a:endParaRPr lang="nl-NL" dirty="0">
+              <a:solidFill>
+                <a:schemeClr val="tx1"/>
+              </a:solidFill>
+            </a:endParaRPr>
+          </a:p>
+          <a:p>
+            <a:pPr marL="0" indent="0">
+              <a:buNone/>
+            </a:pPr>
+            <a:r>
+              <a:rPr lang="nl-NL" dirty="0">
+                <a:solidFill>
+                  <a:schemeClr val="tx1"/>
+                </a:solidFill>
+              </a:rPr>
+              <a:t>Controleren</a:t>
+            </a:r>
+          </a:p>
+          <a:p>
+            <a:pPr marL="0" indent="0">
+              <a:buNone/>
+            </a:pPr>
+            <a:endParaRPr lang="nl-NL" dirty="0">
+              <a:solidFill>
+                <a:schemeClr val="tx1"/>
+              </a:solidFill>
+            </a:endParaRPr>
+          </a:p>
+          <a:p>
+            <a:pPr marL="0" indent="0">
+              <a:buNone/>
+            </a:pPr>
+            <a:r>
+              <a:rPr lang="nl-NL" dirty="0">
+                <a:solidFill>
+                  <a:schemeClr val="tx1"/>
+                </a:solidFill>
+              </a:rPr>
+              <a:t>De </a:t>
+            </a:r>
+            <a:r>
+              <a:rPr lang="nl-NL" dirty="0" err="1">
+                <a:solidFill>
+                  <a:schemeClr val="tx1"/>
+                </a:solidFill>
+              </a:rPr>
+              <a:t>request</a:t>
+            </a:r>
+            <a:endParaRPr lang="nl-NL" dirty="0">
+              <a:solidFill>
+                <a:schemeClr val="tx1"/>
+              </a:solidFill>
+            </a:endParaRPr>
+          </a:p>
+          <a:p>
+            <a:pPr marL="0" indent="0">
+              <a:buNone/>
+            </a:pPr>
+            <a:endParaRPr lang="nl-NL" dirty="0">
+              <a:solidFill>
+                <a:schemeClr val="tx1"/>
+              </a:solidFill>
+            </a:endParaRPr>
+          </a:p>
+          <a:p>
+            <a:pPr marL="0" indent="0">
+              <a:buNone/>
+            </a:pPr>
+            <a:r>
+              <a:rPr lang="nl-NL" dirty="0">
+                <a:solidFill>
+                  <a:schemeClr val="tx1"/>
+                </a:solidFill>
+              </a:rPr>
+              <a:t>Parsen</a:t>
+            </a:r>
+          </a:p>
+        </p:txBody>
+      </p:sp>
+      <p:pic>
+        <p:nvPicPr>
+          <p:cNvPr id="7" name="Afbeelding 6">
+            <a:extLst>
+              <a:ext uri="{FF2B5EF4-FFF2-40B4-BE49-F238E27FC236}">
+                <a16:creationId xmlns:a16="http://schemas.microsoft.com/office/drawing/2014/main" id="{04F4100C-E490-415F-8AA6-2D18BCBFDDBB}"/>
+              </a:ext>
+            </a:extLst>
+          </p:cNvPr>
+          <p:cNvPicPr>
+            <a:picLocks noChangeAspect="1"/>
+          </p:cNvPicPr>
+          <p:nvPr/>
+        </p:nvPicPr>
+        <p:blipFill>
+          <a:blip r:embed="rId2"/>
+          <a:stretch>
+            <a:fillRect/>
+          </a:stretch>
+        </p:blipFill>
+        <p:spPr>
+          <a:xfrm>
+            <a:off x="4951412" y="2068511"/>
+            <a:ext cx="3629025" cy="971550"/>
+          </a:xfrm>
+          <a:prstGeom prst="rect">
+            <a:avLst/>
+          </a:prstGeom>
+        </p:spPr>
+      </p:pic>
+      <p:pic>
+        <p:nvPicPr>
+          <p:cNvPr id="9" name="Afbeelding 8">
+            <a:extLst>
+              <a:ext uri="{FF2B5EF4-FFF2-40B4-BE49-F238E27FC236}">
+                <a16:creationId xmlns:a16="http://schemas.microsoft.com/office/drawing/2014/main" id="{80970760-C275-4021-A965-3B9488D949AF}"/>
+              </a:ext>
+            </a:extLst>
+          </p:cNvPr>
+          <p:cNvPicPr>
+            <a:picLocks noChangeAspect="1"/>
+          </p:cNvPicPr>
+          <p:nvPr/>
+        </p:nvPicPr>
+        <p:blipFill>
+          <a:blip r:embed="rId3"/>
+          <a:stretch>
+            <a:fillRect/>
+          </a:stretch>
+        </p:blipFill>
+        <p:spPr>
+          <a:xfrm>
+            <a:off x="4951412" y="3749541"/>
+            <a:ext cx="5572125" cy="466725"/>
+          </a:xfrm>
+          <a:prstGeom prst="rect">
+            <a:avLst/>
+          </a:prstGeom>
+        </p:spPr>
+      </p:pic>
+      <p:pic>
+        <p:nvPicPr>
+          <p:cNvPr id="1026" name="Picture 2" descr="Afbeeldingsresultaat voor gezichtsherkenning&quot;">
+            <a:extLst>
+              <a:ext uri="{FF2B5EF4-FFF2-40B4-BE49-F238E27FC236}">
+                <a16:creationId xmlns:a16="http://schemas.microsoft.com/office/drawing/2014/main" id="{DBAEA8CB-BB00-4D30-9B7A-21AB67A30F70}"/>
+              </a:ext>
+            </a:extLst>
+          </p:cNvPr>
+          <p:cNvPicPr>
+            <a:picLocks noChangeAspect="1" noChangeArrowheads="1"/>
+          </p:cNvPicPr>
+          <p:nvPr/>
+        </p:nvPicPr>
+        <p:blipFill>
+          <a:blip r:embed="rId4">
+            <a:extLst>
+              <a:ext uri="{BEBA8EAE-BF5A-486C-A8C5-ECC9F3942E4B}">
+                <a14:imgProps xmlns:a14="http://schemas.microsoft.com/office/drawing/2010/main">
+                  <a14:imgLayer r:embed="rId5">
+                    <a14:imgEffect>
+                      <a14:backgroundRemoval t="9884" b="95155" l="10000" r="90000">
+                        <a14:foregroundMark x1="44194" y1="24419" x2="52903" y2="21899"/>
+                        <a14:foregroundMark x1="52903" y1="21899" x2="48871" y2="31589"/>
+                        <a14:foregroundMark x1="48871" y1="31589" x2="58065" y2="32752"/>
+                        <a14:foregroundMark x1="58065" y1="32752" x2="55161" y2="43023"/>
+                        <a14:foregroundMark x1="55161" y1="43023" x2="45484" y2="45155"/>
+                        <a14:foregroundMark x1="45484" y1="45155" x2="50323" y2="33721"/>
+                        <a14:foregroundMark x1="50323" y1="33721" x2="56129" y2="44961"/>
+                        <a14:foregroundMark x1="56129" y1="44961" x2="48387" y2="51357"/>
+                        <a14:foregroundMark x1="48387" y1="51357" x2="47903" y2="80814"/>
+                        <a14:foregroundMark x1="47903" y1="80814" x2="56452" y2="85659"/>
+                        <a14:foregroundMark x1="56452" y1="85659" x2="61129" y2="94186"/>
+                        <a14:foregroundMark x1="61129" y1="94186" x2="45161" y2="98256"/>
+                        <a14:foregroundMark x1="45161" y1="98256" x2="27742" y2="95155"/>
+                        <a14:foregroundMark x1="27742" y1="95155" x2="27742" y2="81977"/>
+                        <a14:foregroundMark x1="27742" y1="81977" x2="31452" y2="78488"/>
+                      </a14:backgroundRemoval>
+                    </a14:imgEffect>
+                  </a14:imgLayer>
+                </a14:imgProps>
+              </a:ext>
+              <a:ext uri="{28A0092B-C50C-407E-A947-70E740481C1C}">
+                <a14:useLocalDpi xmlns:a14="http://schemas.microsoft.com/office/drawing/2010/main" val="0"/>
+              </a:ext>
+            </a:extLst>
+          </a:blip>
+          <a:srcRect/>
+          <a:stretch>
+            <a:fillRect/>
+          </a:stretch>
+        </p:blipFill>
+        <p:spPr bwMode="auto">
+          <a:xfrm>
+            <a:off x="8773434" y="-164320"/>
+            <a:ext cx="3500206" cy="2913075"/>
+          </a:xfrm>
+          <a:prstGeom prst="rect">
+            <a:avLst/>
+          </a:prstGeom>
+          <a:noFill/>
+          <a:extLst>
+            <a:ext uri="{909E8E84-426E-40DD-AFC4-6F175D3DCCD1}">
+              <a14:hiddenFill xmlns:a14="http://schemas.microsoft.com/office/drawing/2010/main">
+                <a:solidFill>
+                  <a:srgbClr val="FFFFFF"/>
+                </a:solidFill>
+              </a14:hiddenFill>
+            </a:ext>
+          </a:extLst>
+        </p:spPr>
+      </p:pic>
+      <p:pic>
+        <p:nvPicPr>
+          <p:cNvPr id="10" name="Afbeelding 9">
+            <a:extLst>
+              <a:ext uri="{FF2B5EF4-FFF2-40B4-BE49-F238E27FC236}">
+                <a16:creationId xmlns:a16="http://schemas.microsoft.com/office/drawing/2014/main" id="{ADD9518E-7F26-40A1-A937-C3F91542B367}"/>
+              </a:ext>
+            </a:extLst>
+          </p:cNvPr>
+          <p:cNvPicPr>
+            <a:picLocks noChangeAspect="1"/>
+          </p:cNvPicPr>
+          <p:nvPr/>
+        </p:nvPicPr>
+        <p:blipFill>
+          <a:blip r:embed="rId6"/>
+          <a:stretch>
+            <a:fillRect/>
+          </a:stretch>
+        </p:blipFill>
+        <p:spPr>
+          <a:xfrm>
+            <a:off x="4951412" y="4509070"/>
+            <a:ext cx="5610225" cy="2047875"/>
+          </a:xfrm>
+          <a:prstGeom prst="rect">
+            <a:avLst/>
+          </a:prstGeom>
+        </p:spPr>
+      </p:pic>
+    </p:spTree>
+    <p:extLst>
+      <p:ext uri="{BB962C8B-B14F-4D97-AF65-F5344CB8AC3E}">
+        <p14:creationId xmlns:p14="http://schemas.microsoft.com/office/powerpoint/2010/main" val="2381562085"/>
+      </p:ext>
+    </p:extLst>
+  </p:cSld>
+  <p:clrMapOvr>
+    <a:masterClrMapping/>
+  </p:clrMapOvr>
+</p:sld>
+</file>
+
 <file path=ppt/theme/theme1.xml><?xml version="1.0" encoding="utf-8"?>
 <a:theme xmlns:a="http://schemas.openxmlformats.org/drawingml/2006/main" name="Segment">
   <a:themeElements>

</xml_diff>